<commit_message>
added notification & database
</commit_message>
<xml_diff>
--- a/Android Day11.pptx
+++ b/Android Day11.pptx
@@ -15,10 +15,10 @@
     <p:sldId id="294" r:id="rId3"/>
     <p:sldId id="286" r:id="rId4"/>
     <p:sldId id="342" r:id="rId5"/>
-    <p:sldId id="367" r:id="rId6"/>
-    <p:sldId id="369" r:id="rId7"/>
-    <p:sldId id="368" r:id="rId8"/>
-    <p:sldId id="370" r:id="rId9"/>
+    <p:sldId id="368" r:id="rId6"/>
+    <p:sldId id="370" r:id="rId7"/>
+    <p:sldId id="367" r:id="rId8"/>
+    <p:sldId id="369" r:id="rId9"/>
     <p:sldId id="371" r:id="rId10"/>
     <p:sldId id="372" r:id="rId11"/>
     <p:sldId id="373" r:id="rId12"/>
@@ -1740,7 +1740,7 @@
           <a:p>
             <a:fld id="{D7CD6017-FECC-4565-B4A9-CDF40B8AFEC4}" type="datetimeFigureOut">
               <a:rPr lang="en-IN" smtClean="0"/>
-              <a:t>28/06/19</a:t>
+              <a:t>01/07/19</a:t>
             </a:fld>
             <a:endParaRPr lang="en-IN"/>
           </a:p>
@@ -1918,7 +1918,7 @@
           <a:p>
             <a:fld id="{9F3C1A20-E642-F347-A89C-E093F8996D44}" type="datetimeFigureOut">
               <a:rPr lang="en-US" smtClean="0"/>
-              <a:t>6/28/19</a:t>
+              <a:t>7/1/19</a:t>
             </a:fld>
             <a:endParaRPr lang="en-US"/>
           </a:p>
@@ -2438,7 +2438,7 @@
           <a:p>
             <a:fld id="{C65558FE-7BAE-4F41-B1DE-C9E081343886}" type="datetime1">
               <a:rPr lang="en-IN" smtClean="0"/>
-              <a:t>28/06/19</a:t>
+              <a:t>01/07/19</a:t>
             </a:fld>
             <a:endParaRPr lang="en-IN" dirty="0"/>
           </a:p>
@@ -2655,7 +2655,7 @@
           <a:p>
             <a:fld id="{C546BFA6-7020-A842-AFE3-43A763B8DE0A}" type="datetime1">
               <a:rPr lang="en-IN" smtClean="0"/>
-              <a:t>28/06/19</a:t>
+              <a:t>01/07/19</a:t>
             </a:fld>
             <a:endParaRPr lang="en-IN"/>
           </a:p>
@@ -3899,7 +3899,7 @@
           <a:p>
             <a:fld id="{24A60580-2B70-6940-B3F0-E4F8AB7AA3B6}" type="datetime1">
               <a:rPr lang="en-IN" smtClean="0"/>
-              <a:t>28/06/19</a:t>
+              <a:t>01/07/19</a:t>
             </a:fld>
             <a:endParaRPr lang="en-IN"/>
           </a:p>
@@ -4131,7 +4131,7 @@
           <a:p>
             <a:fld id="{2FB0970A-5D49-E646-889A-E8EA6023EA9A}" type="datetime1">
               <a:rPr lang="en-IN" smtClean="0"/>
-              <a:t>28/06/19</a:t>
+              <a:t>01/07/19</a:t>
             </a:fld>
             <a:endParaRPr lang="en-IN"/>
           </a:p>
@@ -4976,7 +4976,7 @@
           <a:p>
             <a:fld id="{60F6970B-5F9F-1C49-823B-784ECC0F8F74}" type="datetime1">
               <a:rPr lang="en-IN" smtClean="0"/>
-              <a:t>28/06/19</a:t>
+              <a:t>01/07/19</a:t>
             </a:fld>
             <a:endParaRPr lang="en-IN"/>
           </a:p>
@@ -5564,7 +5564,7 @@
           <a:p>
             <a:fld id="{04CF2939-C6E8-734E-A964-0558AE677560}" type="datetime1">
               <a:rPr lang="en-IN" smtClean="0"/>
-              <a:t>28/06/19</a:t>
+              <a:t>01/07/19</a:t>
             </a:fld>
             <a:endParaRPr lang="en-IN"/>
           </a:p>
@@ -6824,7 +6824,7 @@
           <a:p>
             <a:fld id="{55E1E18D-3351-C242-BAA6-DD72A5C1D791}" type="datetime1">
               <a:rPr lang="en-IN" smtClean="0"/>
-              <a:t>28/06/19</a:t>
+              <a:t>01/07/19</a:t>
             </a:fld>
             <a:endParaRPr lang="en-IN"/>
           </a:p>
@@ -6897,7 +6897,7 @@
           <a:noFill/>
           <a:extLst>
             <a:ext uri="{909E8E84-426E-40dd-AFC4-6F175D3DCCD1}">
-              <a14:hiddenFill xmlns="" xmlns:a14="http://schemas.microsoft.com/office/drawing/2010/main">
+              <a14:hiddenFill xmlns:a14="http://schemas.microsoft.com/office/drawing/2010/main" xmlns="">
                 <a:solidFill>
                   <a:srgbClr val="FFFFFF"/>
                 </a:solidFill>
@@ -7577,7 +7577,7 @@
           <a:p>
             <a:fld id="{6F3FE410-33A2-CB47-8127-299FF22D1A22}" type="datetime1">
               <a:rPr lang="en-IN" smtClean="0"/>
-              <a:t>28/06/19</a:t>
+              <a:t>01/07/19</a:t>
             </a:fld>
             <a:endParaRPr lang="en-IN"/>
           </a:p>
@@ -11148,7 +11148,7 @@
           <a:p>
             <a:fld id="{500D484D-755B-CC43-99C4-2BB0EB76FEF6}" type="datetime1">
               <a:rPr lang="en-IN" smtClean="0"/>
-              <a:t>28/06/19</a:t>
+              <a:t>01/07/19</a:t>
             </a:fld>
             <a:endParaRPr lang="en-IN"/>
           </a:p>
@@ -11851,7 +11851,7 @@
           <a:p>
             <a:fld id="{3825AC8A-E3E4-AB4D-AABE-2AF883CEDDEB}" type="datetime1">
               <a:rPr lang="en-IN" smtClean="0"/>
-              <a:t>28/06/19</a:t>
+              <a:t>01/07/19</a:t>
             </a:fld>
             <a:endParaRPr/>
           </a:p>
@@ -12320,7 +12320,7 @@
           <a:p>
             <a:fld id="{7DD0C667-8BB3-D74C-86FC-7D0CD1167351}" type="datetime1">
               <a:rPr lang="en-IN" smtClean="0"/>
-              <a:t>28/06/19</a:t>
+              <a:t>01/07/19</a:t>
             </a:fld>
             <a:endParaRPr lang="en-IN" dirty="0"/>
           </a:p>
@@ -12622,7 +12622,7 @@
           <a:p>
             <a:fld id="{54E004E4-6425-1046-B03F-6799B0FFAEB1}" type="datetime1">
               <a:rPr lang="en-IN" smtClean="0"/>
-              <a:t>28/06/19</a:t>
+              <a:t>01/07/19</a:t>
             </a:fld>
             <a:endParaRPr lang="en-IN"/>
           </a:p>
@@ -14060,7 +14060,7 @@
           <a:p>
             <a:fld id="{94A31C2B-8F11-8248-906D-0BD56E359BFE}" type="datetime1">
               <a:rPr lang="en-IN" smtClean="0"/>
-              <a:t>28/06/19</a:t>
+              <a:t>01/07/19</a:t>
             </a:fld>
             <a:endParaRPr lang="en-IN" dirty="0"/>
           </a:p>
@@ -15199,7 +15199,7 @@
           <a:p>
             <a:fld id="{A3A67E1C-BAD1-994B-B7B0-0862E7408890}" type="datetime1">
               <a:rPr lang="en-IN" smtClean="0"/>
-              <a:t>28/06/19</a:t>
+              <a:t>01/07/19</a:t>
             </a:fld>
             <a:endParaRPr lang="en-IN" dirty="0"/>
           </a:p>
@@ -16159,7 +16159,7 @@
           <a:p>
             <a:fld id="{AAC8EB75-20B8-FA41-8A25-CB9D4F4E068B}" type="datetime1">
               <a:rPr lang="en-IN" smtClean="0"/>
-              <a:t>28/06/19</a:t>
+              <a:t>01/07/19</a:t>
             </a:fld>
             <a:endParaRPr lang="en-IN" dirty="0"/>
           </a:p>
@@ -16668,7 +16668,7 @@
           <a:p>
             <a:fld id="{4EB8ED25-022A-B848-9E47-2A9D6C0BE6AE}" type="datetime1">
               <a:rPr lang="en-IN" smtClean="0"/>
-              <a:t>28/06/19</a:t>
+              <a:t>01/07/19</a:t>
             </a:fld>
             <a:endParaRPr lang="en-IN" dirty="0"/>
           </a:p>
@@ -17592,7 +17592,7 @@
           <a:p>
             <a:fld id="{371B733E-A046-7440-A009-9222C7A6AB80}" type="datetime1">
               <a:rPr lang="en-IN" smtClean="0"/>
-              <a:t>28/06/19</a:t>
+              <a:t>01/07/19</a:t>
             </a:fld>
             <a:endParaRPr lang="en-IN" dirty="0"/>
           </a:p>
@@ -18807,7 +18807,7 @@
           <a:p>
             <a:fld id="{EB6B529C-358E-464A-80D3-B4DD91120955}" type="datetime1">
               <a:rPr lang="en-IN" smtClean="0"/>
-              <a:t>28/06/19</a:t>
+              <a:t>01/07/19</a:t>
             </a:fld>
             <a:endParaRPr lang="en-IN" dirty="0"/>
           </a:p>
@@ -19617,7 +19617,7 @@
           <a:p>
             <a:fld id="{6E6F5B52-1A05-484E-BE74-C10EC951FF81}" type="datetime1">
               <a:rPr lang="en-IN" smtClean="0"/>
-              <a:t>28/06/19</a:t>
+              <a:t>01/07/19</a:t>
             </a:fld>
             <a:endParaRPr lang="en-IN" dirty="0"/>
           </a:p>
@@ -20373,7 +20373,7 @@
           <a:p>
             <a:fld id="{330D92EB-81BB-3B43-94C7-8FE4C43F772A}" type="datetime1">
               <a:rPr lang="en-IN" smtClean="0"/>
-              <a:t>28/06/19</a:t>
+              <a:t>01/07/19</a:t>
             </a:fld>
             <a:endParaRPr lang="en-IN" dirty="0"/>
           </a:p>
@@ -20456,7 +20456,7 @@
           <a:p>
             <a:fld id="{24A60580-2B70-6940-B3F0-E4F8AB7AA3B6}" type="datetime1">
               <a:rPr lang="en-IN" smtClean="0"/>
-              <a:t>28/06/19</a:t>
+              <a:t>01/07/19</a:t>
             </a:fld>
             <a:endParaRPr lang="en-IN"/>
           </a:p>
@@ -20732,7 +20732,7 @@
           <a:p>
             <a:fld id="{24A60580-2B70-6940-B3F0-E4F8AB7AA3B6}" type="datetime1">
               <a:rPr lang="en-IN" smtClean="0"/>
-              <a:t>28/06/19</a:t>
+              <a:t>01/07/19</a:t>
             </a:fld>
             <a:endParaRPr lang="en-IN"/>
           </a:p>
@@ -20911,7 +20911,7 @@
           <a:p>
             <a:fld id="{24A60580-2B70-6940-B3F0-E4F8AB7AA3B6}" type="datetime1">
               <a:rPr lang="en-IN" smtClean="0"/>
-              <a:t>28/06/19</a:t>
+              <a:t>01/07/19</a:t>
             </a:fld>
             <a:endParaRPr lang="en-IN"/>
           </a:p>
@@ -21292,7 +21292,7 @@
           <a:p>
             <a:fld id="{05F9FE4C-6887-C742-8AA6-90375168B633}" type="datetime1">
               <a:rPr lang="en-IN" smtClean="0"/>
-              <a:t>28/06/19</a:t>
+              <a:t>01/07/19</a:t>
             </a:fld>
             <a:endParaRPr lang="en-IN" dirty="0"/>
           </a:p>
@@ -21431,7 +21431,7 @@
                 <a:cs typeface="Proxima Nova"/>
                 <a:sym typeface="Proxima Nova"/>
               </a:rPr>
-              <a:t>28/06/19</a:t>
+              <a:t>01/07/19</a:t>
             </a:fld>
             <a:endParaRPr sz="900">
               <a:solidFill>
@@ -21799,7 +21799,7 @@
               <a:rPr lang="en-IN" sz="900" smtClean="0">
                 <a:latin typeface="Proxima Nova Rg" pitchFamily="50" charset="0"/>
               </a:rPr>
-              <a:t>28/06/19</a:t>
+              <a:t>01/07/19</a:t>
             </a:fld>
             <a:endParaRPr lang="en-IN" sz="900" dirty="0">
               <a:latin typeface="Proxima Nova Rg" pitchFamily="50" charset="0"/>
@@ -21929,7 +21929,7 @@
         <p:spPr>
           <a:xfrm>
             <a:off x="1126962" y="1552653"/>
-            <a:ext cx="6171763" cy="646331"/>
+            <a:ext cx="6171763" cy="369332"/>
           </a:xfrm>
           <a:prstGeom prst="rect">
             <a:avLst/>
@@ -21952,21 +21952,7 @@
                   <a:schemeClr val="bg1"/>
                 </a:solidFill>
               </a:rPr>
-              <a:t>Notifications (continue)</a:t>
-            </a:r>
-          </a:p>
-          <a:p>
-            <a:pPr marL="342900" indent="-342900">
-              <a:buFont typeface="+mj-lt"/>
-              <a:buAutoNum type="arabicPeriod"/>
-            </a:pPr>
-            <a:r>
-              <a:rPr lang="en-US" dirty="0">
-                <a:solidFill>
-                  <a:schemeClr val="bg1"/>
-                </a:solidFill>
-              </a:rPr>
-              <a:t>View Pager</a:t>
+              <a:t>Notifications </a:t>
             </a:r>
           </a:p>
         </p:txBody>
@@ -22034,7 +22020,7 @@
               <a:rPr lang="en-IN" sz="900" smtClean="0">
                 <a:latin typeface="Proxima Nova Rg" pitchFamily="50" charset="0"/>
               </a:rPr>
-              <a:t>28/06/19</a:t>
+              <a:t>01/07/19</a:t>
             </a:fld>
             <a:endParaRPr lang="en-IN" sz="900" dirty="0">
               <a:latin typeface="Proxima Nova Rg" pitchFamily="50" charset="0"/>
@@ -22163,8 +22149,8 @@
         </p:nvSpPr>
         <p:spPr>
           <a:xfrm>
-            <a:off x="1223214" y="1581528"/>
-            <a:ext cx="6171763" cy="646331"/>
+            <a:off x="1203964" y="1504526"/>
+            <a:ext cx="6171763" cy="923330"/>
           </a:xfrm>
           <a:prstGeom prst="rect">
             <a:avLst/>
@@ -22178,7 +22164,19 @@
           <a:lstStyle/>
           <a:p>
             <a:pPr marL="342900" indent="-342900">
-              <a:buFont typeface="+mj-lt"/>
+              <a:buAutoNum type="arabicPeriod"/>
+            </a:pPr>
+            <a:r>
+              <a:rPr lang="en-US" dirty="0">
+                <a:solidFill>
+                  <a:schemeClr val="bg1"/>
+                </a:solidFill>
+              </a:rPr>
+              <a:t>Broadcast Receivers</a:t>
+            </a:r>
+          </a:p>
+          <a:p>
+            <a:pPr marL="342900" indent="-342900">
               <a:buAutoNum type="arabicPeriod"/>
             </a:pPr>
             <a:r>
@@ -22192,16 +22190,23 @@
           </a:p>
           <a:p>
             <a:pPr marL="342900" indent="-342900">
-              <a:buFont typeface="+mj-lt"/>
               <a:buAutoNum type="arabicPeriod"/>
             </a:pPr>
+            <a:r>
+              <a:rPr lang="en-US" dirty="0" err="1">
+                <a:solidFill>
+                  <a:schemeClr val="bg1"/>
+                </a:solidFill>
+              </a:rPr>
+              <a:t>Sql</a:t>
+            </a:r>
             <a:r>
               <a:rPr lang="en-US" dirty="0">
                 <a:solidFill>
                   <a:schemeClr val="bg1"/>
                 </a:solidFill>
               </a:rPr>
-              <a:t>Broadcast Receivers</a:t>
+              <a:t> lite</a:t>
             </a:r>
           </a:p>
         </p:txBody>
@@ -22241,7 +22246,7 @@
           <p:cNvPr id="3" name="Content Placeholder 2">
             <a:extLst>
               <a:ext uri="{FF2B5EF4-FFF2-40B4-BE49-F238E27FC236}">
-                <a16:creationId xmlns:a16="http://schemas.microsoft.com/office/drawing/2014/main" id="{A90D567B-D5B6-6349-BEEA-FF1A3720D2E8}"/>
+                <a16:creationId xmlns:a16="http://schemas.microsoft.com/office/drawing/2014/main" id="{0E19B3A8-8A91-AC47-85AD-07753853C20F}"/>
               </a:ext>
             </a:extLst>
           </p:cNvPr>
@@ -22254,8 +22259,8 @@
         </p:nvSpPr>
         <p:spPr>
           <a:xfrm>
-            <a:off x="628650" y="930392"/>
-            <a:ext cx="7886700" cy="2380699"/>
+            <a:off x="628650" y="1159013"/>
+            <a:ext cx="7543198" cy="1949948"/>
           </a:xfrm>
         </p:spPr>
         <p:txBody>
@@ -22264,7 +22269,7 @@
           <a:p>
             <a:r>
               <a:rPr lang="en-US" dirty="0"/>
-              <a:t>Android service is a component that is used to perform operations on the background such as playing music, handle network transactions, interacting content providers etc. It doesn't has any UI (user interface).</a:t>
+              <a:t>Broadcast Receivers simply respond to broadcast messages from other applications or from the system itself. These messages are sometime called events or intents. For example, applications can also initiate broadcasts to let other applications know that some data has been downloaded to the device and is available for them to use, so this is broadcast receiver who will intercept this communication and will initiate appropriate action.</a:t>
             </a:r>
           </a:p>
         </p:txBody>
@@ -22274,7 +22279,7 @@
           <p:cNvPr id="4" name="Date Placeholder 3">
             <a:extLst>
               <a:ext uri="{FF2B5EF4-FFF2-40B4-BE49-F238E27FC236}">
-                <a16:creationId xmlns:a16="http://schemas.microsoft.com/office/drawing/2014/main" id="{C6699D5F-C7BE-274F-B576-8C1BBF4D3EC1}"/>
+                <a16:creationId xmlns:a16="http://schemas.microsoft.com/office/drawing/2014/main" id="{DF1E0C13-8B71-D543-A679-C307F1FB01EE}"/>
               </a:ext>
             </a:extLst>
           </p:cNvPr>
@@ -22292,7 +22297,7 @@
           <a:p>
             <a:fld id="{AAC8EB75-20B8-FA41-8A25-CB9D4F4E068B}" type="datetime1">
               <a:rPr lang="en-IN" smtClean="0"/>
-              <a:t>28/06/19</a:t>
+              <a:t>01/07/19</a:t>
             </a:fld>
             <a:endParaRPr lang="en-IN" dirty="0"/>
           </a:p>
@@ -22303,7 +22308,7 @@
           <p:cNvPr id="5" name="Slide Number Placeholder 4">
             <a:extLst>
               <a:ext uri="{FF2B5EF4-FFF2-40B4-BE49-F238E27FC236}">
-                <a16:creationId xmlns:a16="http://schemas.microsoft.com/office/drawing/2014/main" id="{DCC4AABA-B569-E44B-8FE2-48516FD2114D}"/>
+                <a16:creationId xmlns:a16="http://schemas.microsoft.com/office/drawing/2014/main" id="{3EEE84A8-FAB6-A440-8646-6584B204A516}"/>
               </a:ext>
             </a:extLst>
           </p:cNvPr>
@@ -22332,7 +22337,7 @@
           <p:cNvPr id="6" name="Title 5">
             <a:extLst>
               <a:ext uri="{FF2B5EF4-FFF2-40B4-BE49-F238E27FC236}">
-                <a16:creationId xmlns:a16="http://schemas.microsoft.com/office/drawing/2014/main" id="{2CD71ED1-02AC-044C-970E-B0C6AE28AE1C}"/>
+                <a16:creationId xmlns:a16="http://schemas.microsoft.com/office/drawing/2014/main" id="{CE1209E5-437F-4849-8C3D-3B0F9985F674}"/>
               </a:ext>
             </a:extLst>
           </p:cNvPr>
@@ -22350,45 +22355,15 @@
           <a:p>
             <a:r>
               <a:rPr lang="en-US" dirty="0"/>
-              <a:t>Service</a:t>
+              <a:t>Broadcast Receiver</a:t>
             </a:r>
           </a:p>
         </p:txBody>
       </p:sp>
-      <p:pic>
-        <p:nvPicPr>
-          <p:cNvPr id="7" name="Picture 6">
-            <a:extLst>
-              <a:ext uri="{FF2B5EF4-FFF2-40B4-BE49-F238E27FC236}">
-                <a16:creationId xmlns:a16="http://schemas.microsoft.com/office/drawing/2014/main" id="{B116FE17-FCB6-DF44-B6D8-8A4966818C6F}"/>
-              </a:ext>
-            </a:extLst>
-          </p:cNvPr>
-          <p:cNvPicPr>
-            <a:picLocks noChangeAspect="1"/>
-          </p:cNvPicPr>
-          <p:nvPr/>
-        </p:nvPicPr>
-        <p:blipFill>
-          <a:blip r:embed="rId2"/>
-          <a:stretch>
-            <a:fillRect/>
-          </a:stretch>
-        </p:blipFill>
-        <p:spPr>
-          <a:xfrm>
-            <a:off x="2918174" y="1870310"/>
-            <a:ext cx="2268816" cy="2881562"/>
-          </a:xfrm>
-          <a:prstGeom prst="rect">
-            <a:avLst/>
-          </a:prstGeom>
-        </p:spPr>
-      </p:pic>
     </p:spTree>
     <p:extLst>
       <p:ext uri="{BB962C8B-B14F-4D97-AF65-F5344CB8AC3E}">
-        <p14:creationId xmlns:p14="http://schemas.microsoft.com/office/powerpoint/2010/main" val="1294143374"/>
+        <p14:creationId xmlns:p14="http://schemas.microsoft.com/office/powerpoint/2010/main" val="3730608469"/>
       </p:ext>
     </p:extLst>
   </p:cSld>
@@ -22433,8 +22408,8 @@
         </p:nvSpPr>
         <p:spPr>
           <a:xfrm>
-            <a:off x="2892175" y="2290546"/>
-            <a:ext cx="3075488" cy="562407"/>
+            <a:off x="2189100" y="2103791"/>
+            <a:ext cx="5039472" cy="562407"/>
           </a:xfrm>
         </p:spPr>
         <p:txBody>
@@ -22443,7 +22418,7 @@
           <a:p>
             <a:r>
               <a:rPr lang="en-US" dirty="0"/>
-              <a:t>Demo Service</a:t>
+              <a:t>Demo Broadcast Receiver</a:t>
             </a:r>
           </a:p>
         </p:txBody>
@@ -22471,7 +22446,7 @@
           <a:p>
             <a:fld id="{AAC8EB75-20B8-FA41-8A25-CB9D4F4E068B}" type="datetime1">
               <a:rPr lang="en-IN" smtClean="0"/>
-              <a:t>28/06/19</a:t>
+              <a:t>01/07/19</a:t>
             </a:fld>
             <a:endParaRPr lang="en-IN" dirty="0"/>
           </a:p>
@@ -22509,7 +22484,7 @@
     </p:spTree>
     <p:extLst>
       <p:ext uri="{BB962C8B-B14F-4D97-AF65-F5344CB8AC3E}">
-        <p14:creationId xmlns:p14="http://schemas.microsoft.com/office/powerpoint/2010/main" val="3893835078"/>
+        <p14:creationId xmlns:p14="http://schemas.microsoft.com/office/powerpoint/2010/main" val="3210668199"/>
       </p:ext>
     </p:extLst>
   </p:cSld>
@@ -22541,7 +22516,7 @@
           <p:cNvPr id="3" name="Content Placeholder 2">
             <a:extLst>
               <a:ext uri="{FF2B5EF4-FFF2-40B4-BE49-F238E27FC236}">
-                <a16:creationId xmlns:a16="http://schemas.microsoft.com/office/drawing/2014/main" id="{0E19B3A8-8A91-AC47-85AD-07753853C20F}"/>
+                <a16:creationId xmlns:a16="http://schemas.microsoft.com/office/drawing/2014/main" id="{A90D567B-D5B6-6349-BEEA-FF1A3720D2E8}"/>
               </a:ext>
             </a:extLst>
           </p:cNvPr>
@@ -22554,8 +22529,8 @@
         </p:nvSpPr>
         <p:spPr>
           <a:xfrm>
-            <a:off x="628650" y="1159013"/>
-            <a:ext cx="7543198" cy="1949948"/>
+            <a:off x="628650" y="930392"/>
+            <a:ext cx="7886700" cy="2380699"/>
           </a:xfrm>
         </p:spPr>
         <p:txBody>
@@ -22564,7 +22539,7 @@
           <a:p>
             <a:r>
               <a:rPr lang="en-US" dirty="0"/>
-              <a:t>Broadcast Receivers simply respond to broadcast messages from other applications or from the system itself. These messages are sometime called events or intents. For example, applications can also initiate broadcasts to let other applications know that some data has been downloaded to the device and is available for them to use, so this is broadcast receiver who will intercept this communication and will initiate appropriate action.</a:t>
+              <a:t>Android service is a component that is used to perform operations on the background such as playing music, handle network transactions, interacting content providers etc. It doesn't has any UI (user interface).</a:t>
             </a:r>
           </a:p>
         </p:txBody>
@@ -22574,7 +22549,7 @@
           <p:cNvPr id="4" name="Date Placeholder 3">
             <a:extLst>
               <a:ext uri="{FF2B5EF4-FFF2-40B4-BE49-F238E27FC236}">
-                <a16:creationId xmlns:a16="http://schemas.microsoft.com/office/drawing/2014/main" id="{DF1E0C13-8B71-D543-A679-C307F1FB01EE}"/>
+                <a16:creationId xmlns:a16="http://schemas.microsoft.com/office/drawing/2014/main" id="{C6699D5F-C7BE-274F-B576-8C1BBF4D3EC1}"/>
               </a:ext>
             </a:extLst>
           </p:cNvPr>
@@ -22592,7 +22567,7 @@
           <a:p>
             <a:fld id="{AAC8EB75-20B8-FA41-8A25-CB9D4F4E068B}" type="datetime1">
               <a:rPr lang="en-IN" smtClean="0"/>
-              <a:t>28/06/19</a:t>
+              <a:t>01/07/19</a:t>
             </a:fld>
             <a:endParaRPr lang="en-IN" dirty="0"/>
           </a:p>
@@ -22603,7 +22578,7 @@
           <p:cNvPr id="5" name="Slide Number Placeholder 4">
             <a:extLst>
               <a:ext uri="{FF2B5EF4-FFF2-40B4-BE49-F238E27FC236}">
-                <a16:creationId xmlns:a16="http://schemas.microsoft.com/office/drawing/2014/main" id="{3EEE84A8-FAB6-A440-8646-6584B204A516}"/>
+                <a16:creationId xmlns:a16="http://schemas.microsoft.com/office/drawing/2014/main" id="{DCC4AABA-B569-E44B-8FE2-48516FD2114D}"/>
               </a:ext>
             </a:extLst>
           </p:cNvPr>
@@ -22632,7 +22607,7 @@
           <p:cNvPr id="6" name="Title 5">
             <a:extLst>
               <a:ext uri="{FF2B5EF4-FFF2-40B4-BE49-F238E27FC236}">
-                <a16:creationId xmlns:a16="http://schemas.microsoft.com/office/drawing/2014/main" id="{CE1209E5-437F-4849-8C3D-3B0F9985F674}"/>
+                <a16:creationId xmlns:a16="http://schemas.microsoft.com/office/drawing/2014/main" id="{2CD71ED1-02AC-044C-970E-B0C6AE28AE1C}"/>
               </a:ext>
             </a:extLst>
           </p:cNvPr>
@@ -22650,15 +22625,45 @@
           <a:p>
             <a:r>
               <a:rPr lang="en-US" dirty="0"/>
-              <a:t>Broadcast Receiver</a:t>
+              <a:t>Service</a:t>
             </a:r>
           </a:p>
         </p:txBody>
       </p:sp>
+      <p:pic>
+        <p:nvPicPr>
+          <p:cNvPr id="7" name="Picture 6">
+            <a:extLst>
+              <a:ext uri="{FF2B5EF4-FFF2-40B4-BE49-F238E27FC236}">
+                <a16:creationId xmlns:a16="http://schemas.microsoft.com/office/drawing/2014/main" id="{B116FE17-FCB6-DF44-B6D8-8A4966818C6F}"/>
+              </a:ext>
+            </a:extLst>
+          </p:cNvPr>
+          <p:cNvPicPr>
+            <a:picLocks noChangeAspect="1"/>
+          </p:cNvPicPr>
+          <p:nvPr/>
+        </p:nvPicPr>
+        <p:blipFill>
+          <a:blip r:embed="rId2"/>
+          <a:stretch>
+            <a:fillRect/>
+          </a:stretch>
+        </p:blipFill>
+        <p:spPr>
+          <a:xfrm>
+            <a:off x="2918174" y="1870310"/>
+            <a:ext cx="2268816" cy="2881562"/>
+          </a:xfrm>
+          <a:prstGeom prst="rect">
+            <a:avLst/>
+          </a:prstGeom>
+        </p:spPr>
+      </p:pic>
     </p:spTree>
     <p:extLst>
       <p:ext uri="{BB962C8B-B14F-4D97-AF65-F5344CB8AC3E}">
-        <p14:creationId xmlns:p14="http://schemas.microsoft.com/office/powerpoint/2010/main" val="3730608469"/>
+        <p14:creationId xmlns:p14="http://schemas.microsoft.com/office/powerpoint/2010/main" val="1294143374"/>
       </p:ext>
     </p:extLst>
   </p:cSld>
@@ -22703,8 +22708,8 @@
         </p:nvSpPr>
         <p:spPr>
           <a:xfrm>
-            <a:off x="2189100" y="2103791"/>
-            <a:ext cx="5039472" cy="562407"/>
+            <a:off x="2892175" y="2290546"/>
+            <a:ext cx="3075488" cy="562407"/>
           </a:xfrm>
         </p:spPr>
         <p:txBody>
@@ -22713,7 +22718,7 @@
           <a:p>
             <a:r>
               <a:rPr lang="en-US" dirty="0"/>
-              <a:t>Demo Broadcast Receiver</a:t>
+              <a:t>Demo Service</a:t>
             </a:r>
           </a:p>
         </p:txBody>
@@ -22741,7 +22746,7 @@
           <a:p>
             <a:fld id="{AAC8EB75-20B8-FA41-8A25-CB9D4F4E068B}" type="datetime1">
               <a:rPr lang="en-IN" smtClean="0"/>
-              <a:t>28/06/19</a:t>
+              <a:t>01/07/19</a:t>
             </a:fld>
             <a:endParaRPr lang="en-IN" dirty="0"/>
           </a:p>
@@ -22779,7 +22784,7 @@
     </p:spTree>
     <p:extLst>
       <p:ext uri="{BB962C8B-B14F-4D97-AF65-F5344CB8AC3E}">
-        <p14:creationId xmlns:p14="http://schemas.microsoft.com/office/powerpoint/2010/main" val="3210668199"/>
+        <p14:creationId xmlns:p14="http://schemas.microsoft.com/office/powerpoint/2010/main" val="3893835078"/>
       </p:ext>
     </p:extLst>
   </p:cSld>
@@ -22829,7 +22834,7 @@
           <a:p>
             <a:fld id="{7DD0C667-8BB3-D74C-86FC-7D0CD1167351}" type="datetime1">
               <a:rPr lang="en-IN" smtClean="0"/>
-              <a:t>28/06/19</a:t>
+              <a:t>01/07/19</a:t>
             </a:fld>
             <a:endParaRPr lang="en-IN" dirty="0"/>
           </a:p>

</xml_diff>